<commit_message>
Added a lot of notes to the CoalescedHashing powerpoint
</commit_message>
<xml_diff>
--- a/CoalescedHashing.pptx
+++ b/CoalescedHashing.pptx
@@ -300,7 +300,7 @@
             <a:fld id="{FFC318C4-A102-40D0-B9C8-77BC819A2582}" type="datetimeFigureOut">
               <a:rPr lang="en-US" smtClean="0"/>
               <a:pPr/>
-              <a:t>10/14/2013</a:t>
+              <a:t>10/19/2013</a:t>
             </a:fld>
             <a:endParaRPr lang="en-US"/>
           </a:p>
@@ -467,7 +467,7 @@
             <a:fld id="{FFC318C4-A102-40D0-B9C8-77BC819A2582}" type="datetimeFigureOut">
               <a:rPr lang="en-US" smtClean="0"/>
               <a:pPr/>
-              <a:t>10/14/2013</a:t>
+              <a:t>10/19/2013</a:t>
             </a:fld>
             <a:endParaRPr lang="en-US"/>
           </a:p>
@@ -644,7 +644,7 @@
             <a:fld id="{FFC318C4-A102-40D0-B9C8-77BC819A2582}" type="datetimeFigureOut">
               <a:rPr lang="en-US" smtClean="0"/>
               <a:pPr/>
-              <a:t>10/14/2013</a:t>
+              <a:t>10/19/2013</a:t>
             </a:fld>
             <a:endParaRPr lang="en-US"/>
           </a:p>
@@ -811,7 +811,7 @@
             <a:fld id="{FFC318C4-A102-40D0-B9C8-77BC819A2582}" type="datetimeFigureOut">
               <a:rPr lang="en-US" smtClean="0"/>
               <a:pPr/>
-              <a:t>10/14/2013</a:t>
+              <a:t>10/19/2013</a:t>
             </a:fld>
             <a:endParaRPr lang="en-US"/>
           </a:p>
@@ -1054,7 +1054,7 @@
             <a:fld id="{FFC318C4-A102-40D0-B9C8-77BC819A2582}" type="datetimeFigureOut">
               <a:rPr lang="en-US" smtClean="0"/>
               <a:pPr/>
-              <a:t>10/14/2013</a:t>
+              <a:t>10/19/2013</a:t>
             </a:fld>
             <a:endParaRPr lang="en-US"/>
           </a:p>
@@ -1339,7 +1339,7 @@
             <a:fld id="{FFC318C4-A102-40D0-B9C8-77BC819A2582}" type="datetimeFigureOut">
               <a:rPr lang="en-US" smtClean="0"/>
               <a:pPr/>
-              <a:t>10/14/2013</a:t>
+              <a:t>10/19/2013</a:t>
             </a:fld>
             <a:endParaRPr lang="en-US"/>
           </a:p>
@@ -1758,7 +1758,7 @@
             <a:fld id="{FFC318C4-A102-40D0-B9C8-77BC819A2582}" type="datetimeFigureOut">
               <a:rPr lang="en-US" smtClean="0"/>
               <a:pPr/>
-              <a:t>10/14/2013</a:t>
+              <a:t>10/19/2013</a:t>
             </a:fld>
             <a:endParaRPr lang="en-US"/>
           </a:p>
@@ -1873,7 +1873,7 @@
             <a:fld id="{FFC318C4-A102-40D0-B9C8-77BC819A2582}" type="datetimeFigureOut">
               <a:rPr lang="en-US" smtClean="0"/>
               <a:pPr/>
-              <a:t>10/14/2013</a:t>
+              <a:t>10/19/2013</a:t>
             </a:fld>
             <a:endParaRPr lang="en-US"/>
           </a:p>
@@ -1965,7 +1965,7 @@
             <a:fld id="{FFC318C4-A102-40D0-B9C8-77BC819A2582}" type="datetimeFigureOut">
               <a:rPr lang="en-US" smtClean="0"/>
               <a:pPr/>
-              <a:t>10/14/2013</a:t>
+              <a:t>10/19/2013</a:t>
             </a:fld>
             <a:endParaRPr lang="en-US"/>
           </a:p>
@@ -2239,7 +2239,7 @@
             <a:fld id="{FFC318C4-A102-40D0-B9C8-77BC819A2582}" type="datetimeFigureOut">
               <a:rPr lang="en-US" smtClean="0"/>
               <a:pPr/>
-              <a:t>10/14/2013</a:t>
+              <a:t>10/19/2013</a:t>
             </a:fld>
             <a:endParaRPr lang="en-US"/>
           </a:p>
@@ -2489,7 +2489,7 @@
             <a:fld id="{FFC318C4-A102-40D0-B9C8-77BC819A2582}" type="datetimeFigureOut">
               <a:rPr lang="en-US" smtClean="0"/>
               <a:pPr/>
-              <a:t>10/14/2013</a:t>
+              <a:t>10/19/2013</a:t>
             </a:fld>
             <a:endParaRPr lang="en-US"/>
           </a:p>
@@ -2699,7 +2699,7 @@
             <a:fld id="{FFC318C4-A102-40D0-B9C8-77BC819A2582}" type="datetimeFigureOut">
               <a:rPr lang="en-US" smtClean="0"/>
               <a:pPr/>
-              <a:t>10/14/2013</a:t>
+              <a:t>10/19/2013</a:t>
             </a:fld>
             <a:endParaRPr lang="en-US"/>
           </a:p>
@@ -3090,8 +3090,8 @@
               </a:tblPr>
               <a:tblGrid>
                 <a:gridCol w="711200"/>
-                <a:gridCol w="711200"/>
-                <a:gridCol w="711200"/>
+                <a:gridCol w="812800"/>
+                <a:gridCol w="609600"/>
               </a:tblGrid>
               <a:tr h="370840">
                 <a:tc>
@@ -3505,7 +3505,7 @@
         </p:nvCxnSpPr>
         <p:spPr>
           <a:xfrm rot="10800000">
-            <a:off x="3733800" y="1524000"/>
+            <a:off x="3810000" y="1524000"/>
             <a:ext cx="990600" cy="1588"/>
           </a:xfrm>
           <a:prstGeom prst="straightConnector1">
@@ -3538,7 +3538,7 @@
         </p:nvSpPr>
         <p:spPr>
           <a:xfrm>
-            <a:off x="3216275" y="1574800"/>
+            <a:off x="3292475" y="1574800"/>
             <a:ext cx="180446" cy="355600"/>
           </a:xfrm>
           <a:custGeom>
@@ -3629,7 +3629,7 @@
         </p:nvSpPr>
         <p:spPr>
           <a:xfrm>
-            <a:off x="3216275" y="1939925"/>
+            <a:off x="3292475" y="1939925"/>
             <a:ext cx="180446" cy="355600"/>
           </a:xfrm>
           <a:custGeom>
@@ -3720,7 +3720,7 @@
         </p:nvSpPr>
         <p:spPr>
           <a:xfrm>
-            <a:off x="3216275" y="2305050"/>
+            <a:off x="3292475" y="2305050"/>
             <a:ext cx="180446" cy="355600"/>
           </a:xfrm>
           <a:custGeom>
@@ -3811,7 +3811,7 @@
         </p:nvSpPr>
         <p:spPr>
           <a:xfrm>
-            <a:off x="3216275" y="2670175"/>
+            <a:off x="3292475" y="2670175"/>
             <a:ext cx="180446" cy="355600"/>
           </a:xfrm>
           <a:custGeom>
@@ -3902,7 +3902,7 @@
         </p:nvSpPr>
         <p:spPr>
           <a:xfrm>
-            <a:off x="3216275" y="3035300"/>
+            <a:off x="3292475" y="3035300"/>
             <a:ext cx="180446" cy="355600"/>
           </a:xfrm>
           <a:custGeom>
@@ -3993,7 +3993,7 @@
         </p:nvSpPr>
         <p:spPr>
           <a:xfrm>
-            <a:off x="3216275" y="3400425"/>
+            <a:off x="3292475" y="3400425"/>
             <a:ext cx="180446" cy="355600"/>
           </a:xfrm>
           <a:custGeom>
@@ -4084,7 +4084,7 @@
         </p:nvSpPr>
         <p:spPr>
           <a:xfrm>
-            <a:off x="3216275" y="3765550"/>
+            <a:off x="3292475" y="3765550"/>
             <a:ext cx="180446" cy="355600"/>
           </a:xfrm>
           <a:custGeom>
@@ -4175,7 +4175,7 @@
         </p:nvSpPr>
         <p:spPr>
           <a:xfrm>
-            <a:off x="3216275" y="4130675"/>
+            <a:off x="3292475" y="4130675"/>
             <a:ext cx="180446" cy="355600"/>
           </a:xfrm>
           <a:custGeom>
@@ -4266,7 +4266,7 @@
         </p:nvSpPr>
         <p:spPr>
           <a:xfrm>
-            <a:off x="3216275" y="4495800"/>
+            <a:off x="3292475" y="4495800"/>
             <a:ext cx="180446" cy="355600"/>
           </a:xfrm>
           <a:custGeom>
@@ -4346,6 +4346,96 @@
           <a:p>
             <a:pPr algn="ctr"/>
             <a:endParaRPr lang="en-US"/>
+          </a:p>
+        </p:txBody>
+      </p:sp>
+      <p:sp>
+        <p:nvSpPr>
+          <p:cNvPr id="13" name="TextBox 12"/>
+          <p:cNvSpPr txBox="1"/>
+          <p:nvPr/>
+        </p:nvSpPr>
+        <p:spPr>
+          <a:xfrm>
+            <a:off x="4114800" y="2667000"/>
+            <a:ext cx="2667000" cy="1477328"/>
+          </a:xfrm>
+          <a:prstGeom prst="rect">
+            <a:avLst/>
+          </a:prstGeom>
+          <a:noFill/>
+        </p:spPr>
+        <p:txBody>
+          <a:bodyPr wrap="square" rtlCol="0">
+            <a:spAutoFit/>
+          </a:bodyPr>
+          <a:lstStyle/>
+          <a:p>
+            <a:r>
+              <a:rPr lang="en-US" dirty="0" smtClean="0"/>
+              <a:t>Hash table with ten slots.</a:t>
+            </a:r>
+          </a:p>
+          <a:p>
+            <a:r>
+              <a:rPr lang="en-US" dirty="0" smtClean="0"/>
+              <a:t>Initial </a:t>
+            </a:r>
+            <a:r>
+              <a:rPr lang="en-US" dirty="0" smtClean="0"/>
+              <a:t>state:  </a:t>
+            </a:r>
+          </a:p>
+          <a:p>
+            <a:pPr>
+              <a:buFont typeface="Arial" charset="0"/>
+              <a:buChar char="•"/>
+            </a:pPr>
+            <a:r>
+              <a:rPr lang="en-US" dirty="0" smtClean="0"/>
+              <a:t> collision slot is 0</a:t>
+            </a:r>
+          </a:p>
+          <a:p>
+            <a:pPr>
+              <a:buFont typeface="Arial" charset="0"/>
+              <a:buChar char="•"/>
+            </a:pPr>
+            <a:r>
+              <a:rPr lang="en-US" dirty="0" smtClean="0"/>
+              <a:t> linked list keeps track of where the empty slots are</a:t>
+            </a:r>
+            <a:endParaRPr lang="en-US" dirty="0"/>
+          </a:p>
+        </p:txBody>
+      </p:sp>
+      <p:sp>
+        <p:nvSpPr>
+          <p:cNvPr id="15" name="TextBox 14"/>
+          <p:cNvSpPr txBox="1"/>
+          <p:nvPr/>
+        </p:nvSpPr>
+        <p:spPr>
+          <a:xfrm>
+            <a:off x="4876800" y="1371600"/>
+            <a:ext cx="304800" cy="369332"/>
+          </a:xfrm>
+          <a:prstGeom prst="rect">
+            <a:avLst/>
+          </a:prstGeom>
+          <a:noFill/>
+        </p:spPr>
+        <p:txBody>
+          <a:bodyPr wrap="square" rtlCol="0">
+            <a:spAutoFit/>
+          </a:bodyPr>
+          <a:lstStyle/>
+          <a:p>
+            <a:r>
+              <a:rPr lang="en-US" dirty="0" smtClean="0"/>
+              <a:t>0</a:t>
+            </a:r>
+            <a:endParaRPr lang="en-US" dirty="0"/>
           </a:p>
         </p:txBody>
       </p:sp>
@@ -4394,8 +4484,8 @@
               </a:tblPr>
               <a:tblGrid>
                 <a:gridCol w="711200"/>
-                <a:gridCol w="711200"/>
-                <a:gridCol w="711200"/>
+                <a:gridCol w="812800"/>
+                <a:gridCol w="609600"/>
               </a:tblGrid>
               <a:tr h="370840">
                 <a:tc>
@@ -4418,8 +4508,8 @@
                     <a:lstStyle/>
                     <a:p>
                       <a:r>
-                        <a:rPr lang="en-US" dirty="0" err="1" smtClean="0"/>
-                        <a:t>ofu</a:t>
+                        <a:rPr lang="en-US" dirty="0" smtClean="0"/>
+                        <a:t>ofu-8</a:t>
                       </a:r>
                       <a:endParaRPr lang="en-US" dirty="0"/>
                     </a:p>
@@ -4470,12 +4560,16 @@
                     <a:lstStyle/>
                     <a:p>
                       <a:r>
-                        <a:rPr lang="en-US" dirty="0" err="1" smtClean="0">
+                        <a:rPr lang="en-US" dirty="0" smtClean="0">
                           <a:solidFill>
                             <a:schemeClr val="tx1"/>
                           </a:solidFill>
                         </a:rPr>
                         <a:t>gcl</a:t>
+                      </a:r>
+                      <a:r>
+                        <a:rPr lang="en-US" dirty="0" smtClean="0"/>
+                        <a:t>-8</a:t>
                       </a:r>
                       <a:endParaRPr lang="en-US" dirty="0">
                         <a:solidFill>
@@ -4530,8 +4624,8 @@
                     <a:lstStyle/>
                     <a:p>
                       <a:r>
-                        <a:rPr lang="en-US" dirty="0" err="1" smtClean="0"/>
-                        <a:t>qur</a:t>
+                        <a:rPr lang="en-US" dirty="0" smtClean="0"/>
+                        <a:t>qur-2</a:t>
                       </a:r>
                       <a:endParaRPr lang="en-US" dirty="0"/>
                     </a:p>
@@ -4582,12 +4676,12 @@
                     <a:lstStyle/>
                     <a:p>
                       <a:r>
-                        <a:rPr lang="en-US" dirty="0" err="1" smtClean="0">
+                        <a:rPr lang="en-US" dirty="0" smtClean="0">
                           <a:solidFill>
                             <a:schemeClr val="tx1"/>
                           </a:solidFill>
                         </a:rPr>
-                        <a:t>clq</a:t>
+                        <a:t>clq-1</a:t>
                       </a:r>
                       <a:endParaRPr lang="en-US" dirty="0">
                         <a:solidFill>
@@ -4703,7 +4797,7 @@
                     <a:p>
                       <a:r>
                         <a:rPr lang="en-US" dirty="0" smtClean="0"/>
-                        <a:t>dim</a:t>
+                        <a:t>dim-5</a:t>
                       </a:r>
                       <a:endParaRPr lang="en-US" dirty="0"/>
                     </a:p>
@@ -4754,8 +4848,8 @@
                     <a:lstStyle/>
                     <a:p>
                       <a:r>
-                        <a:rPr lang="en-US" dirty="0" err="1" smtClean="0"/>
-                        <a:t>aty</a:t>
+                        <a:rPr lang="en-US" dirty="0" smtClean="0"/>
+                        <a:t>aty-6</a:t>
                       </a:r>
                       <a:endParaRPr lang="en-US" dirty="0"/>
                     </a:p>
@@ -4806,8 +4900,8 @@
                     <a:lstStyle/>
                     <a:p>
                       <a:r>
-                        <a:rPr lang="en-US" dirty="0" err="1" smtClean="0"/>
-                        <a:t>rhv</a:t>
+                        <a:rPr lang="en-US" dirty="0" smtClean="0"/>
+                        <a:t>rhv-7</a:t>
                       </a:r>
                       <a:endParaRPr lang="en-US" dirty="0"/>
                     </a:p>
@@ -4858,8 +4952,8 @@
                     <a:lstStyle/>
                     <a:p>
                       <a:r>
-                        <a:rPr lang="en-US" dirty="0" err="1" smtClean="0"/>
-                        <a:t>qrj</a:t>
+                        <a:rPr lang="en-US" dirty="0" smtClean="0"/>
+                        <a:t>qrj-8</a:t>
                       </a:r>
                       <a:endParaRPr lang="en-US" dirty="0"/>
                     </a:p>
@@ -4941,7 +5035,7 @@
         </p:nvCxnSpPr>
         <p:spPr>
           <a:xfrm rot="10800000">
-            <a:off x="3581400" y="4876800"/>
+            <a:off x="3657600" y="4876800"/>
             <a:ext cx="990600" cy="1588"/>
           </a:xfrm>
           <a:prstGeom prst="straightConnector1">
@@ -5306,6 +5400,98 @@
           </a:p>
         </p:txBody>
       </p:sp>
+      <p:sp>
+        <p:nvSpPr>
+          <p:cNvPr id="9" name="TextBox 8"/>
+          <p:cNvSpPr txBox="1"/>
+          <p:nvPr/>
+        </p:nvSpPr>
+        <p:spPr>
+          <a:xfrm>
+            <a:off x="4724400" y="4724400"/>
+            <a:ext cx="304800" cy="369332"/>
+          </a:xfrm>
+          <a:prstGeom prst="rect">
+            <a:avLst/>
+          </a:prstGeom>
+          <a:noFill/>
+        </p:spPr>
+        <p:txBody>
+          <a:bodyPr wrap="square" rtlCol="0">
+            <a:spAutoFit/>
+          </a:bodyPr>
+          <a:lstStyle/>
+          <a:p>
+            <a:r>
+              <a:rPr lang="en-US" dirty="0" smtClean="0">
+                <a:solidFill>
+                  <a:srgbClr val="FF0000"/>
+                </a:solidFill>
+              </a:rPr>
+              <a:t>9</a:t>
+            </a:r>
+            <a:endParaRPr lang="en-US" dirty="0">
+              <a:solidFill>
+                <a:srgbClr val="FF0000"/>
+              </a:solidFill>
+            </a:endParaRPr>
+          </a:p>
+        </p:txBody>
+      </p:sp>
+      <p:sp>
+        <p:nvSpPr>
+          <p:cNvPr id="10" name="TextBox 9"/>
+          <p:cNvSpPr txBox="1"/>
+          <p:nvPr/>
+        </p:nvSpPr>
+        <p:spPr>
+          <a:xfrm>
+            <a:off x="4038600" y="2133600"/>
+            <a:ext cx="4419600" cy="2031325"/>
+          </a:xfrm>
+          <a:prstGeom prst="rect">
+            <a:avLst/>
+          </a:prstGeom>
+          <a:noFill/>
+        </p:spPr>
+        <p:txBody>
+          <a:bodyPr wrap="square" rtlCol="0">
+            <a:spAutoFit/>
+          </a:bodyPr>
+          <a:lstStyle/>
+          <a:p>
+            <a:r>
+              <a:rPr lang="en-US" dirty="0" smtClean="0"/>
+              <a:t>Yet another item that wants to be in slot 8:  collision.</a:t>
+            </a:r>
+          </a:p>
+          <a:p>
+            <a:pPr>
+              <a:buFont typeface="Arial" charset="0"/>
+              <a:buChar char="•"/>
+            </a:pPr>
+            <a:r>
+              <a:rPr lang="en-US" dirty="0" smtClean="0"/>
+              <a:t> Insert it into the collision slot (4) and update the collision slot pointer to the next in the list (9).</a:t>
+            </a:r>
+          </a:p>
+          <a:p>
+            <a:pPr>
+              <a:buFont typeface="Arial" charset="0"/>
+              <a:buChar char="•"/>
+            </a:pPr>
+            <a:r>
+              <a:rPr lang="en-US" dirty="0" smtClean="0"/>
+              <a:t> </a:t>
+            </a:r>
+            <a:r>
+              <a:rPr lang="en-US" dirty="0" smtClean="0"/>
+              <a:t>Add this to the end of the slot 8 chain: a pointer from slot 3 to this item.</a:t>
+            </a:r>
+            <a:endParaRPr lang="en-US" dirty="0"/>
+          </a:p>
+        </p:txBody>
+      </p:sp>
     </p:spTree>
   </p:cSld>
   <p:clrMapOvr>
@@ -5351,8 +5537,8 @@
               </a:tblPr>
               <a:tblGrid>
                 <a:gridCol w="711200"/>
-                <a:gridCol w="711200"/>
-                <a:gridCol w="711200"/>
+                <a:gridCol w="812800"/>
+                <a:gridCol w="609600"/>
               </a:tblGrid>
               <a:tr h="370840">
                 <a:tc>
@@ -5375,8 +5561,8 @@
                     <a:lstStyle/>
                     <a:p>
                       <a:r>
-                        <a:rPr lang="en-US" dirty="0" err="1" smtClean="0"/>
-                        <a:t>ofu</a:t>
+                        <a:rPr lang="en-US" dirty="0" smtClean="0"/>
+                        <a:t>ofu-8</a:t>
                       </a:r>
                       <a:endParaRPr lang="en-US" dirty="0"/>
                     </a:p>
@@ -5427,12 +5613,16 @@
                     <a:lstStyle/>
                     <a:p>
                       <a:r>
-                        <a:rPr lang="en-US" dirty="0" err="1" smtClean="0">
+                        <a:rPr lang="en-US" dirty="0" smtClean="0">
                           <a:solidFill>
                             <a:schemeClr val="tx1"/>
                           </a:solidFill>
                         </a:rPr>
                         <a:t>gcl</a:t>
+                      </a:r>
+                      <a:r>
+                        <a:rPr lang="en-US" dirty="0" smtClean="0"/>
+                        <a:t>-8</a:t>
                       </a:r>
                       <a:endParaRPr lang="en-US" dirty="0">
                         <a:solidFill>
@@ -5487,8 +5677,8 @@
                     <a:lstStyle/>
                     <a:p>
                       <a:r>
-                        <a:rPr lang="en-US" dirty="0" err="1" smtClean="0"/>
-                        <a:t>qur</a:t>
+                        <a:rPr lang="en-US" dirty="0" smtClean="0"/>
+                        <a:t>qur-2</a:t>
                       </a:r>
                       <a:endParaRPr lang="en-US" dirty="0"/>
                     </a:p>
@@ -5539,12 +5729,12 @@
                     <a:lstStyle/>
                     <a:p>
                       <a:r>
-                        <a:rPr lang="en-US" dirty="0" err="1" smtClean="0">
+                        <a:rPr lang="en-US" dirty="0" smtClean="0">
                           <a:solidFill>
                             <a:schemeClr val="tx1"/>
                           </a:solidFill>
                         </a:rPr>
-                        <a:t>clq</a:t>
+                        <a:t>clq-1</a:t>
                       </a:r>
                       <a:endParaRPr lang="en-US" dirty="0">
                         <a:solidFill>
@@ -5599,12 +5789,12 @@
                     <a:lstStyle/>
                     <a:p>
                       <a:r>
-                        <a:rPr lang="en-US" dirty="0" err="1" smtClean="0">
+                        <a:rPr lang="en-US" dirty="0" smtClean="0">
                           <a:solidFill>
                             <a:schemeClr val="tx1"/>
                           </a:solidFill>
                         </a:rPr>
-                        <a:t>ecd</a:t>
+                        <a:t>ecd-8</a:t>
                       </a:r>
                       <a:endParaRPr lang="en-US" dirty="0">
                         <a:solidFill>
@@ -5660,7 +5850,7 @@
                     <a:p>
                       <a:r>
                         <a:rPr lang="en-US" dirty="0" smtClean="0"/>
-                        <a:t>dim</a:t>
+                        <a:t>dim-5</a:t>
                       </a:r>
                       <a:endParaRPr lang="en-US" dirty="0"/>
                     </a:p>
@@ -5711,8 +5901,8 @@
                     <a:lstStyle/>
                     <a:p>
                       <a:r>
-                        <a:rPr lang="en-US" dirty="0" err="1" smtClean="0"/>
-                        <a:t>aty</a:t>
+                        <a:rPr lang="en-US" dirty="0" smtClean="0"/>
+                        <a:t>aty-6</a:t>
                       </a:r>
                       <a:endParaRPr lang="en-US" dirty="0"/>
                     </a:p>
@@ -5763,8 +5953,8 @@
                     <a:lstStyle/>
                     <a:p>
                       <a:r>
-                        <a:rPr lang="en-US" dirty="0" err="1" smtClean="0"/>
-                        <a:t>rhv</a:t>
+                        <a:rPr lang="en-US" dirty="0" smtClean="0"/>
+                        <a:t>rhv-7</a:t>
                       </a:r>
                       <a:endParaRPr lang="en-US" dirty="0"/>
                     </a:p>
@@ -5815,8 +6005,8 @@
                     <a:lstStyle/>
                     <a:p>
                       <a:r>
-                        <a:rPr lang="en-US" dirty="0" err="1" smtClean="0"/>
-                        <a:t>qrj</a:t>
+                        <a:rPr lang="en-US" dirty="0" smtClean="0"/>
+                        <a:t>qrj-8</a:t>
                       </a:r>
                       <a:endParaRPr lang="en-US" dirty="0"/>
                     </a:p>
@@ -6250,7 +6440,7 @@
         </p:nvSpPr>
         <p:spPr>
           <a:xfrm>
-            <a:off x="3246120" y="3802380"/>
+            <a:off x="3352800" y="3810000"/>
             <a:ext cx="252730" cy="998220"/>
           </a:xfrm>
           <a:custGeom>
@@ -6318,6 +6508,94 @@
           <a:p>
             <a:pPr algn="ctr"/>
             <a:endParaRPr lang="en-US"/>
+          </a:p>
+        </p:txBody>
+      </p:sp>
+      <p:sp>
+        <p:nvSpPr>
+          <p:cNvPr id="9" name="TextBox 8"/>
+          <p:cNvSpPr txBox="1"/>
+          <p:nvPr/>
+        </p:nvSpPr>
+        <p:spPr>
+          <a:xfrm>
+            <a:off x="4495800" y="4724400"/>
+            <a:ext cx="304800" cy="369332"/>
+          </a:xfrm>
+          <a:prstGeom prst="rect">
+            <a:avLst/>
+          </a:prstGeom>
+          <a:noFill/>
+        </p:spPr>
+        <p:txBody>
+          <a:bodyPr wrap="square" rtlCol="0">
+            <a:spAutoFit/>
+          </a:bodyPr>
+          <a:lstStyle/>
+          <a:p>
+            <a:r>
+              <a:rPr lang="en-US" dirty="0" smtClean="0">
+                <a:solidFill>
+                  <a:srgbClr val="FF0000"/>
+                </a:solidFill>
+              </a:rPr>
+              <a:t>*</a:t>
+            </a:r>
+            <a:endParaRPr lang="en-US" dirty="0">
+              <a:solidFill>
+                <a:srgbClr val="FF0000"/>
+              </a:solidFill>
+            </a:endParaRPr>
+          </a:p>
+        </p:txBody>
+      </p:sp>
+      <p:sp>
+        <p:nvSpPr>
+          <p:cNvPr id="10" name="TextBox 9"/>
+          <p:cNvSpPr txBox="1"/>
+          <p:nvPr/>
+        </p:nvSpPr>
+        <p:spPr>
+          <a:xfrm>
+            <a:off x="4038600" y="2133600"/>
+            <a:ext cx="4419600" cy="1754326"/>
+          </a:xfrm>
+          <a:prstGeom prst="rect">
+            <a:avLst/>
+          </a:prstGeom>
+          <a:noFill/>
+        </p:spPr>
+        <p:txBody>
+          <a:bodyPr wrap="square" rtlCol="0">
+            <a:spAutoFit/>
+          </a:bodyPr>
+          <a:lstStyle/>
+          <a:p>
+            <a:r>
+              <a:rPr lang="en-US" dirty="0" smtClean="0"/>
+              <a:t>This item wants to be in slot 6:  collision.</a:t>
+            </a:r>
+          </a:p>
+          <a:p>
+            <a:pPr>
+              <a:buFont typeface="Arial" charset="0"/>
+              <a:buChar char="•"/>
+            </a:pPr>
+            <a:r>
+              <a:rPr lang="en-US" dirty="0" smtClean="0"/>
+              <a:t> Insert it into the collision slot (9).  This time, there are no empty slots, so the collision slot becomes “*”</a:t>
+            </a:r>
+          </a:p>
+          <a:p>
+            <a:pPr>
+              <a:buFont typeface="Arial" charset="0"/>
+              <a:buChar char="•"/>
+            </a:pPr>
+            <a:r>
+              <a:rPr lang="en-US" dirty="0" smtClean="0"/>
+              <a:t> Create a slot 6 chain by adding a pointer from slot 6 to this item.</a:t>
+            </a:r>
+            <a:endParaRPr lang="en-US" dirty="0"/>
           </a:p>
         </p:txBody>
       </p:sp>
@@ -6366,8 +6644,8 @@
               </a:tblPr>
               <a:tblGrid>
                 <a:gridCol w="711200"/>
-                <a:gridCol w="711200"/>
-                <a:gridCol w="711200"/>
+                <a:gridCol w="812800"/>
+                <a:gridCol w="609600"/>
               </a:tblGrid>
               <a:tr h="370840">
                 <a:tc>
@@ -6390,8 +6668,8 @@
                     <a:lstStyle/>
                     <a:p>
                       <a:r>
-                        <a:rPr lang="en-US" dirty="0" err="1" smtClean="0"/>
-                        <a:t>ofu</a:t>
+                        <a:rPr lang="en-US" dirty="0" smtClean="0"/>
+                        <a:t>ofu-8</a:t>
                       </a:r>
                       <a:endParaRPr lang="en-US" dirty="0"/>
                     </a:p>
@@ -6434,8 +6712,8 @@
                     <a:lstStyle/>
                     <a:p>
                       <a:r>
-                        <a:rPr lang="en-US" dirty="0" err="1" smtClean="0"/>
-                        <a:t>gcl</a:t>
+                        <a:rPr lang="en-US" dirty="0" smtClean="0"/>
+                        <a:t>gcl-8</a:t>
                       </a:r>
                       <a:endParaRPr lang="en-US" dirty="0"/>
                     </a:p>
@@ -6478,8 +6756,8 @@
                     <a:lstStyle/>
                     <a:p>
                       <a:r>
-                        <a:rPr lang="en-US" dirty="0" err="1" smtClean="0"/>
-                        <a:t>qur</a:t>
+                        <a:rPr lang="en-US" dirty="0" smtClean="0"/>
+                        <a:t>qur-2</a:t>
                       </a:r>
                       <a:endParaRPr lang="en-US" dirty="0"/>
                     </a:p>
@@ -6522,8 +6800,16 @@
                     <a:lstStyle/>
                     <a:p>
                       <a:r>
-                        <a:rPr lang="en-US" dirty="0" err="1" smtClean="0"/>
+                        <a:rPr lang="en-US" dirty="0" smtClean="0"/>
                         <a:t>clq</a:t>
+                      </a:r>
+                      <a:r>
+                        <a:rPr lang="en-US" dirty="0" smtClean="0">
+                          <a:solidFill>
+                            <a:schemeClr val="tx1"/>
+                          </a:solidFill>
+                        </a:rPr>
+                        <a:t>-1</a:t>
                       </a:r>
                       <a:endParaRPr lang="en-US" dirty="0"/>
                     </a:p>
@@ -6566,8 +6852,8 @@
                     <a:lstStyle/>
                     <a:p>
                       <a:r>
-                        <a:rPr lang="en-US" dirty="0" err="1" smtClean="0"/>
-                        <a:t>ecd</a:t>
+                        <a:rPr lang="en-US" dirty="0" smtClean="0"/>
+                        <a:t>ecd-8</a:t>
                       </a:r>
                       <a:endParaRPr lang="en-US" dirty="0"/>
                     </a:p>
@@ -6611,7 +6897,7 @@
                     <a:p>
                       <a:r>
                         <a:rPr lang="en-US" dirty="0" smtClean="0"/>
-                        <a:t>dim</a:t>
+                        <a:t>dim-5</a:t>
                       </a:r>
                       <a:endParaRPr lang="en-US" dirty="0"/>
                     </a:p>
@@ -6654,8 +6940,8 @@
                     <a:lstStyle/>
                     <a:p>
                       <a:r>
-                        <a:rPr lang="en-US" dirty="0" err="1" smtClean="0"/>
-                        <a:t>aty</a:t>
+                        <a:rPr lang="en-US" dirty="0" smtClean="0"/>
+                        <a:t>aty-6</a:t>
                       </a:r>
                       <a:endParaRPr lang="en-US" dirty="0"/>
                     </a:p>
@@ -6698,8 +6984,8 @@
                     <a:lstStyle/>
                     <a:p>
                       <a:r>
-                        <a:rPr lang="en-US" dirty="0" err="1" smtClean="0"/>
-                        <a:t>rhv</a:t>
+                        <a:rPr lang="en-US" dirty="0" smtClean="0"/>
+                        <a:t>rhv-7</a:t>
                       </a:r>
                       <a:endParaRPr lang="en-US" dirty="0"/>
                     </a:p>
@@ -6742,8 +7028,8 @@
                     <a:lstStyle/>
                     <a:p>
                       <a:r>
-                        <a:rPr lang="en-US" dirty="0" err="1" smtClean="0"/>
-                        <a:t>qrj</a:t>
+                        <a:rPr lang="en-US" dirty="0" smtClean="0"/>
+                        <a:t>qrj-8</a:t>
                       </a:r>
                       <a:endParaRPr lang="en-US" dirty="0"/>
                     </a:p>
@@ -6786,8 +7072,8 @@
                     <a:lstStyle/>
                     <a:p>
                       <a:r>
-                        <a:rPr lang="en-US" dirty="0" err="1" smtClean="0"/>
-                        <a:t>qsu</a:t>
+                        <a:rPr lang="en-US" dirty="0" smtClean="0"/>
+                        <a:t>qsu-6</a:t>
                       </a:r>
                       <a:endParaRPr lang="en-US" dirty="0"/>
                     </a:p>
@@ -7161,7 +7447,7 @@
         </p:nvSpPr>
         <p:spPr>
           <a:xfrm>
-            <a:off x="3246120" y="3802380"/>
+            <a:off x="3352800" y="3810000"/>
             <a:ext cx="252730" cy="998220"/>
           </a:xfrm>
           <a:custGeom>
@@ -7229,6 +7515,66 @@
           <a:p>
             <a:pPr algn="ctr"/>
             <a:endParaRPr lang="en-US"/>
+          </a:p>
+        </p:txBody>
+      </p:sp>
+      <p:sp>
+        <p:nvSpPr>
+          <p:cNvPr id="10" name="TextBox 9"/>
+          <p:cNvSpPr txBox="1"/>
+          <p:nvPr/>
+        </p:nvSpPr>
+        <p:spPr>
+          <a:xfrm>
+            <a:off x="4038600" y="2133600"/>
+            <a:ext cx="4419600" cy="1200329"/>
+          </a:xfrm>
+          <a:prstGeom prst="rect">
+            <a:avLst/>
+          </a:prstGeom>
+          <a:noFill/>
+        </p:spPr>
+        <p:txBody>
+          <a:bodyPr wrap="square" rtlCol="0">
+            <a:spAutoFit/>
+          </a:bodyPr>
+          <a:lstStyle/>
+          <a:p>
+            <a:r>
+              <a:rPr lang="en-US" dirty="0" smtClean="0"/>
+              <a:t>Hash table is full.</a:t>
+            </a:r>
+          </a:p>
+          <a:p>
+            <a:r>
+              <a:rPr lang="en-US" dirty="0" smtClean="0"/>
+              <a:t>There are two chains:</a:t>
+            </a:r>
+          </a:p>
+          <a:p>
+            <a:pPr>
+              <a:buFont typeface="Arial" charset="0"/>
+              <a:buChar char="•"/>
+            </a:pPr>
+            <a:r>
+              <a:rPr lang="en-US" dirty="0" smtClean="0"/>
+              <a:t> Combined slot 8 / slot 1 (blue)</a:t>
+            </a:r>
+          </a:p>
+          <a:p>
+            <a:pPr>
+              <a:buFont typeface="Arial" charset="0"/>
+              <a:buChar char="•"/>
+            </a:pPr>
+            <a:r>
+              <a:rPr lang="en-US" dirty="0" smtClean="0"/>
+              <a:t> </a:t>
+            </a:r>
+            <a:r>
+              <a:rPr lang="en-US" dirty="0" smtClean="0"/>
+              <a:t>Slot 6 (green)</a:t>
+            </a:r>
+            <a:endParaRPr lang="en-US" dirty="0"/>
           </a:p>
         </p:txBody>
       </p:sp>
@@ -7277,8 +7623,8 @@
               </a:tblPr>
               <a:tblGrid>
                 <a:gridCol w="711200"/>
-                <a:gridCol w="711200"/>
-                <a:gridCol w="711200"/>
+                <a:gridCol w="812800"/>
+                <a:gridCol w="609600"/>
               </a:tblGrid>
               <a:tr h="370840">
                 <a:tc>
@@ -7629,12 +7975,12 @@
                     <a:lstStyle/>
                     <a:p>
                       <a:r>
-                        <a:rPr lang="en-US" dirty="0" err="1" smtClean="0">
+                        <a:rPr lang="en-US" dirty="0" smtClean="0">
                           <a:solidFill>
                             <a:srgbClr val="FF0000"/>
                           </a:solidFill>
                         </a:rPr>
-                        <a:t>qrj</a:t>
+                        <a:t>qrj-8</a:t>
                       </a:r>
                       <a:endParaRPr lang="en-US" dirty="0">
                         <a:solidFill>
@@ -7720,7 +8066,7 @@
         </p:nvCxnSpPr>
         <p:spPr>
           <a:xfrm rot="10800000">
-            <a:off x="3733800" y="1524000"/>
+            <a:off x="3810000" y="1524000"/>
             <a:ext cx="990600" cy="1588"/>
           </a:xfrm>
           <a:prstGeom prst="straightConnector1">
@@ -7753,7 +8099,7 @@
         </p:nvSpPr>
         <p:spPr>
           <a:xfrm>
-            <a:off x="3216275" y="1574800"/>
+            <a:off x="3292475" y="1574800"/>
             <a:ext cx="180446" cy="355600"/>
           </a:xfrm>
           <a:custGeom>
@@ -7844,7 +8190,7 @@
         </p:nvSpPr>
         <p:spPr>
           <a:xfrm>
-            <a:off x="3216275" y="1939925"/>
+            <a:off x="3292475" y="1939925"/>
             <a:ext cx="180446" cy="355600"/>
           </a:xfrm>
           <a:custGeom>
@@ -7935,7 +8281,7 @@
         </p:nvSpPr>
         <p:spPr>
           <a:xfrm>
-            <a:off x="3216275" y="2305050"/>
+            <a:off x="3292475" y="2305050"/>
             <a:ext cx="180446" cy="355600"/>
           </a:xfrm>
           <a:custGeom>
@@ -8026,7 +8372,7 @@
         </p:nvSpPr>
         <p:spPr>
           <a:xfrm>
-            <a:off x="3216275" y="2670175"/>
+            <a:off x="3292475" y="2670175"/>
             <a:ext cx="180446" cy="355600"/>
           </a:xfrm>
           <a:custGeom>
@@ -8117,7 +8463,7 @@
         </p:nvSpPr>
         <p:spPr>
           <a:xfrm>
-            <a:off x="3216275" y="3035300"/>
+            <a:off x="3292475" y="3035300"/>
             <a:ext cx="180446" cy="355600"/>
           </a:xfrm>
           <a:custGeom>
@@ -8208,7 +8554,7 @@
         </p:nvSpPr>
         <p:spPr>
           <a:xfrm>
-            <a:off x="3216275" y="3400425"/>
+            <a:off x="3292475" y="3400425"/>
             <a:ext cx="180446" cy="355600"/>
           </a:xfrm>
           <a:custGeom>
@@ -8299,7 +8645,7 @@
         </p:nvSpPr>
         <p:spPr>
           <a:xfrm>
-            <a:off x="3216275" y="3765550"/>
+            <a:off x="3292475" y="3765550"/>
             <a:ext cx="180446" cy="355600"/>
           </a:xfrm>
           <a:custGeom>
@@ -8390,7 +8736,7 @@
         </p:nvSpPr>
         <p:spPr>
           <a:xfrm>
-            <a:off x="3216275" y="4130675"/>
+            <a:off x="3292475" y="4130675"/>
             <a:ext cx="180446" cy="660400"/>
           </a:xfrm>
           <a:custGeom>
@@ -8488,6 +8834,66 @@
           <a:p>
             <a:pPr algn="ctr"/>
             <a:endParaRPr lang="en-US"/>
+          </a:p>
+        </p:txBody>
+      </p:sp>
+      <p:sp>
+        <p:nvSpPr>
+          <p:cNvPr id="12" name="TextBox 11"/>
+          <p:cNvSpPr txBox="1"/>
+          <p:nvPr/>
+        </p:nvSpPr>
+        <p:spPr>
+          <a:xfrm>
+            <a:off x="4876800" y="1371600"/>
+            <a:ext cx="304800" cy="369332"/>
+          </a:xfrm>
+          <a:prstGeom prst="rect">
+            <a:avLst/>
+          </a:prstGeom>
+          <a:noFill/>
+        </p:spPr>
+        <p:txBody>
+          <a:bodyPr wrap="square" rtlCol="0">
+            <a:spAutoFit/>
+          </a:bodyPr>
+          <a:lstStyle/>
+          <a:p>
+            <a:r>
+              <a:rPr lang="en-US" dirty="0" smtClean="0"/>
+              <a:t>0</a:t>
+            </a:r>
+            <a:endParaRPr lang="en-US" dirty="0"/>
+          </a:p>
+        </p:txBody>
+      </p:sp>
+      <p:sp>
+        <p:nvSpPr>
+          <p:cNvPr id="13" name="TextBox 12"/>
+          <p:cNvSpPr txBox="1"/>
+          <p:nvPr/>
+        </p:nvSpPr>
+        <p:spPr>
+          <a:xfrm>
+            <a:off x="4114800" y="2667000"/>
+            <a:ext cx="2667000" cy="1200329"/>
+          </a:xfrm>
+          <a:prstGeom prst="rect">
+            <a:avLst/>
+          </a:prstGeom>
+          <a:noFill/>
+        </p:spPr>
+        <p:txBody>
+          <a:bodyPr wrap="square" rtlCol="0">
+            <a:spAutoFit/>
+          </a:bodyPr>
+          <a:lstStyle/>
+          <a:p>
+            <a:r>
+              <a:rPr lang="en-US" dirty="0" smtClean="0"/>
+              <a:t>Insert an item into slot 8.  No collision.  Take slot 8 out of the linked list of empty slots.</a:t>
+            </a:r>
+            <a:endParaRPr lang="en-US" dirty="0"/>
           </a:p>
         </p:txBody>
       </p:sp>
@@ -8536,8 +8942,8 @@
               </a:tblPr>
               <a:tblGrid>
                 <a:gridCol w="711200"/>
-                <a:gridCol w="711200"/>
-                <a:gridCol w="711200"/>
+                <a:gridCol w="812800"/>
+                <a:gridCol w="609600"/>
               </a:tblGrid>
               <a:tr h="370840">
                 <a:tc>
@@ -8808,12 +9214,12 @@
                     <a:lstStyle/>
                     <a:p>
                       <a:r>
-                        <a:rPr lang="en-US" dirty="0" err="1" smtClean="0">
+                        <a:rPr lang="en-US" dirty="0" smtClean="0">
                           <a:solidFill>
                             <a:srgbClr val="FF0000"/>
                           </a:solidFill>
                         </a:rPr>
-                        <a:t>aty</a:t>
+                        <a:t>aty-6</a:t>
                       </a:r>
                       <a:endParaRPr lang="en-US" dirty="0">
                         <a:solidFill>
@@ -8908,8 +9314,8 @@
                     <a:lstStyle/>
                     <a:p>
                       <a:r>
-                        <a:rPr lang="en-US" dirty="0" err="1" smtClean="0"/>
-                        <a:t>qrj</a:t>
+                        <a:rPr lang="en-US" dirty="0" smtClean="0"/>
+                        <a:t>qrj-8</a:t>
                       </a:r>
                       <a:endParaRPr lang="en-US" dirty="0"/>
                     </a:p>
@@ -8983,7 +9389,7 @@
         </p:nvCxnSpPr>
         <p:spPr>
           <a:xfrm rot="10800000">
-            <a:off x="3733800" y="1524000"/>
+            <a:off x="3810000" y="1524000"/>
             <a:ext cx="990600" cy="1588"/>
           </a:xfrm>
           <a:prstGeom prst="straightConnector1">
@@ -9016,7 +9422,7 @@
         </p:nvSpPr>
         <p:spPr>
           <a:xfrm>
-            <a:off x="3216275" y="1574800"/>
+            <a:off x="3292475" y="1574800"/>
             <a:ext cx="180446" cy="355600"/>
           </a:xfrm>
           <a:custGeom>
@@ -9107,7 +9513,7 @@
         </p:nvSpPr>
         <p:spPr>
           <a:xfrm>
-            <a:off x="3216275" y="1939925"/>
+            <a:off x="3292475" y="1939925"/>
             <a:ext cx="180446" cy="355600"/>
           </a:xfrm>
           <a:custGeom>
@@ -9198,7 +9604,7 @@
         </p:nvSpPr>
         <p:spPr>
           <a:xfrm>
-            <a:off x="3216275" y="2305050"/>
+            <a:off x="3292475" y="2305050"/>
             <a:ext cx="180446" cy="355600"/>
           </a:xfrm>
           <a:custGeom>
@@ -9289,7 +9695,7 @@
         </p:nvSpPr>
         <p:spPr>
           <a:xfrm>
-            <a:off x="3216275" y="2670175"/>
+            <a:off x="3292475" y="2670175"/>
             <a:ext cx="180446" cy="355600"/>
           </a:xfrm>
           <a:custGeom>
@@ -9380,7 +9786,7 @@
         </p:nvSpPr>
         <p:spPr>
           <a:xfrm>
-            <a:off x="3216275" y="3035300"/>
+            <a:off x="3292475" y="3035300"/>
             <a:ext cx="180446" cy="355600"/>
           </a:xfrm>
           <a:custGeom>
@@ -9471,7 +9877,7 @@
         </p:nvSpPr>
         <p:spPr>
           <a:xfrm>
-            <a:off x="3216275" y="4130675"/>
+            <a:off x="3292475" y="4130675"/>
             <a:ext cx="180446" cy="660400"/>
           </a:xfrm>
           <a:custGeom>
@@ -9580,7 +9986,7 @@
         </p:nvSpPr>
         <p:spPr>
           <a:xfrm>
-            <a:off x="3200400" y="3429000"/>
+            <a:off x="3276600" y="3429000"/>
             <a:ext cx="180446" cy="660400"/>
           </a:xfrm>
           <a:custGeom>
@@ -9678,6 +10084,66 @@
           <a:p>
             <a:pPr algn="ctr"/>
             <a:endParaRPr lang="en-US"/>
+          </a:p>
+        </p:txBody>
+      </p:sp>
+      <p:sp>
+        <p:nvSpPr>
+          <p:cNvPr id="11" name="TextBox 10"/>
+          <p:cNvSpPr txBox="1"/>
+          <p:nvPr/>
+        </p:nvSpPr>
+        <p:spPr>
+          <a:xfrm>
+            <a:off x="4876800" y="1371600"/>
+            <a:ext cx="304800" cy="369332"/>
+          </a:xfrm>
+          <a:prstGeom prst="rect">
+            <a:avLst/>
+          </a:prstGeom>
+          <a:noFill/>
+        </p:spPr>
+        <p:txBody>
+          <a:bodyPr wrap="square" rtlCol="0">
+            <a:spAutoFit/>
+          </a:bodyPr>
+          <a:lstStyle/>
+          <a:p>
+            <a:r>
+              <a:rPr lang="en-US" dirty="0" smtClean="0"/>
+              <a:t>0</a:t>
+            </a:r>
+            <a:endParaRPr lang="en-US" dirty="0"/>
+          </a:p>
+        </p:txBody>
+      </p:sp>
+      <p:sp>
+        <p:nvSpPr>
+          <p:cNvPr id="12" name="TextBox 11"/>
+          <p:cNvSpPr txBox="1"/>
+          <p:nvPr/>
+        </p:nvSpPr>
+        <p:spPr>
+          <a:xfrm>
+            <a:off x="4114800" y="2667000"/>
+            <a:ext cx="2667000" cy="646331"/>
+          </a:xfrm>
+          <a:prstGeom prst="rect">
+            <a:avLst/>
+          </a:prstGeom>
+          <a:noFill/>
+        </p:spPr>
+        <p:txBody>
+          <a:bodyPr wrap="square" rtlCol="0">
+            <a:spAutoFit/>
+          </a:bodyPr>
+          <a:lstStyle/>
+          <a:p>
+            <a:r>
+              <a:rPr lang="en-US" dirty="0" smtClean="0"/>
+              <a:t>Insert an item into slot 6.  Again, no collision.</a:t>
+            </a:r>
+            <a:endParaRPr lang="en-US" dirty="0"/>
           </a:p>
         </p:txBody>
       </p:sp>
@@ -9726,8 +10192,8 @@
               </a:tblPr>
               <a:tblGrid>
                 <a:gridCol w="711200"/>
-                <a:gridCol w="711200"/>
-                <a:gridCol w="711200"/>
+                <a:gridCol w="812800"/>
+                <a:gridCol w="609600"/>
               </a:tblGrid>
               <a:tr h="370840">
                 <a:tc>
@@ -9838,12 +10304,12 @@
                     <a:lstStyle/>
                     <a:p>
                       <a:r>
-                        <a:rPr lang="en-US" dirty="0" err="1" smtClean="0">
+                        <a:rPr lang="en-US" dirty="0" smtClean="0">
                           <a:solidFill>
                             <a:srgbClr val="FF0000"/>
                           </a:solidFill>
                         </a:rPr>
-                        <a:t>qur</a:t>
+                        <a:t>qur-2</a:t>
                       </a:r>
                       <a:endParaRPr lang="en-US" dirty="0">
                         <a:solidFill>
@@ -10026,8 +10492,8 @@
                     <a:lstStyle/>
                     <a:p>
                       <a:r>
-                        <a:rPr lang="en-US" dirty="0" err="1" smtClean="0"/>
-                        <a:t>aty</a:t>
+                        <a:rPr lang="en-US" dirty="0" smtClean="0"/>
+                        <a:t>aty-6</a:t>
                       </a:r>
                       <a:endParaRPr lang="en-US" dirty="0"/>
                     </a:p>
@@ -10118,8 +10584,8 @@
                     <a:lstStyle/>
                     <a:p>
                       <a:r>
-                        <a:rPr lang="en-US" dirty="0" err="1" smtClean="0"/>
-                        <a:t>qrj</a:t>
+                        <a:rPr lang="en-US" dirty="0" smtClean="0"/>
+                        <a:t>qrj-8</a:t>
                       </a:r>
                       <a:endParaRPr lang="en-US" dirty="0"/>
                     </a:p>
@@ -10193,7 +10659,7 @@
         </p:nvCxnSpPr>
         <p:spPr>
           <a:xfrm rot="10800000">
-            <a:off x="3733800" y="1524000"/>
+            <a:off x="3810000" y="1524000"/>
             <a:ext cx="990600" cy="1588"/>
           </a:xfrm>
           <a:prstGeom prst="straightConnector1">
@@ -10226,7 +10692,7 @@
         </p:nvSpPr>
         <p:spPr>
           <a:xfrm>
-            <a:off x="3216275" y="1574800"/>
+            <a:off x="3292475" y="1574800"/>
             <a:ext cx="180446" cy="355600"/>
           </a:xfrm>
           <a:custGeom>
@@ -10317,7 +10783,7 @@
         </p:nvSpPr>
         <p:spPr>
           <a:xfrm>
-            <a:off x="3216275" y="2670175"/>
+            <a:off x="3292475" y="2670175"/>
             <a:ext cx="180446" cy="355600"/>
           </a:xfrm>
           <a:custGeom>
@@ -10408,7 +10874,7 @@
         </p:nvSpPr>
         <p:spPr>
           <a:xfrm>
-            <a:off x="3216275" y="3035300"/>
+            <a:off x="3292475" y="3035300"/>
             <a:ext cx="180446" cy="355600"/>
           </a:xfrm>
           <a:custGeom>
@@ -10499,7 +10965,7 @@
         </p:nvSpPr>
         <p:spPr>
           <a:xfrm>
-            <a:off x="3216275" y="4130675"/>
+            <a:off x="3292475" y="4130675"/>
             <a:ext cx="180446" cy="660400"/>
           </a:xfrm>
           <a:custGeom>
@@ -10608,7 +11074,7 @@
         </p:nvSpPr>
         <p:spPr>
           <a:xfrm>
-            <a:off x="3200400" y="3429000"/>
+            <a:off x="3276600" y="3429000"/>
             <a:ext cx="180446" cy="660400"/>
           </a:xfrm>
           <a:custGeom>
@@ -10717,7 +11183,7 @@
         </p:nvSpPr>
         <p:spPr>
           <a:xfrm>
-            <a:off x="3200400" y="1981200"/>
+            <a:off x="3276600" y="1981200"/>
             <a:ext cx="180446" cy="660400"/>
           </a:xfrm>
           <a:custGeom>
@@ -10815,6 +11281,66 @@
           <a:p>
             <a:pPr algn="ctr"/>
             <a:endParaRPr lang="en-US"/>
+          </a:p>
+        </p:txBody>
+      </p:sp>
+      <p:sp>
+        <p:nvSpPr>
+          <p:cNvPr id="10" name="TextBox 9"/>
+          <p:cNvSpPr txBox="1"/>
+          <p:nvPr/>
+        </p:nvSpPr>
+        <p:spPr>
+          <a:xfrm>
+            <a:off x="4876800" y="1371600"/>
+            <a:ext cx="304800" cy="369332"/>
+          </a:xfrm>
+          <a:prstGeom prst="rect">
+            <a:avLst/>
+          </a:prstGeom>
+          <a:noFill/>
+        </p:spPr>
+        <p:txBody>
+          <a:bodyPr wrap="square" rtlCol="0">
+            <a:spAutoFit/>
+          </a:bodyPr>
+          <a:lstStyle/>
+          <a:p>
+            <a:r>
+              <a:rPr lang="en-US" dirty="0" smtClean="0"/>
+              <a:t>0</a:t>
+            </a:r>
+            <a:endParaRPr lang="en-US" dirty="0"/>
+          </a:p>
+        </p:txBody>
+      </p:sp>
+      <p:sp>
+        <p:nvSpPr>
+          <p:cNvPr id="11" name="TextBox 10"/>
+          <p:cNvSpPr txBox="1"/>
+          <p:nvPr/>
+        </p:nvSpPr>
+        <p:spPr>
+          <a:xfrm>
+            <a:off x="4114800" y="2667000"/>
+            <a:ext cx="2667000" cy="646331"/>
+          </a:xfrm>
+          <a:prstGeom prst="rect">
+            <a:avLst/>
+          </a:prstGeom>
+          <a:noFill/>
+        </p:spPr>
+        <p:txBody>
+          <a:bodyPr wrap="square" rtlCol="0">
+            <a:spAutoFit/>
+          </a:bodyPr>
+          <a:lstStyle/>
+          <a:p>
+            <a:r>
+              <a:rPr lang="en-US" dirty="0" smtClean="0"/>
+              <a:t>Insert an item into slot 2.  Again, no collision.</a:t>
+            </a:r>
+            <a:endParaRPr lang="en-US" dirty="0"/>
           </a:p>
         </p:txBody>
       </p:sp>
@@ -10863,8 +11389,8 @@
               </a:tblPr>
               <a:tblGrid>
                 <a:gridCol w="711200"/>
-                <a:gridCol w="711200"/>
-                <a:gridCol w="711200"/>
+                <a:gridCol w="812800"/>
+                <a:gridCol w="609600"/>
               </a:tblGrid>
               <a:tr h="370840">
                 <a:tc>
@@ -10975,8 +11501,8 @@
                     <a:lstStyle/>
                     <a:p>
                       <a:r>
-                        <a:rPr lang="en-US" dirty="0" err="1" smtClean="0"/>
-                        <a:t>qur</a:t>
+                        <a:rPr lang="en-US" dirty="0" smtClean="0"/>
+                        <a:t>qur-2</a:t>
                       </a:r>
                       <a:endParaRPr lang="en-US" dirty="0"/>
                     </a:p>
@@ -11120,7 +11646,7 @@
                             <a:srgbClr val="FF0000"/>
                           </a:solidFill>
                         </a:rPr>
-                        <a:t>dim</a:t>
+                        <a:t>dim-5</a:t>
                       </a:r>
                       <a:endParaRPr lang="en-US" dirty="0">
                         <a:solidFill>
@@ -11175,8 +11701,8 @@
                     <a:lstStyle/>
                     <a:p>
                       <a:r>
-                        <a:rPr lang="en-US" dirty="0" err="1" smtClean="0"/>
-                        <a:t>aty</a:t>
+                        <a:rPr lang="en-US" dirty="0" smtClean="0"/>
+                        <a:t>aty-6</a:t>
                       </a:r>
                       <a:endParaRPr lang="en-US" dirty="0"/>
                     </a:p>
@@ -11267,8 +11793,8 @@
                     <a:lstStyle/>
                     <a:p>
                       <a:r>
-                        <a:rPr lang="en-US" dirty="0" err="1" smtClean="0"/>
-                        <a:t>qrj</a:t>
+                        <a:rPr lang="en-US" dirty="0" smtClean="0"/>
+                        <a:t>qrj-8</a:t>
                       </a:r>
                       <a:endParaRPr lang="en-US" dirty="0"/>
                     </a:p>
@@ -11342,7 +11868,7 @@
         </p:nvCxnSpPr>
         <p:spPr>
           <a:xfrm rot="10800000">
-            <a:off x="3733800" y="1524000"/>
+            <a:off x="3810000" y="1524000"/>
             <a:ext cx="990600" cy="1588"/>
           </a:xfrm>
           <a:prstGeom prst="straightConnector1">
@@ -11375,7 +11901,7 @@
         </p:nvSpPr>
         <p:spPr>
           <a:xfrm>
-            <a:off x="3216275" y="1574800"/>
+            <a:off x="3292475" y="1574800"/>
             <a:ext cx="180446" cy="355600"/>
           </a:xfrm>
           <a:custGeom>
@@ -11466,7 +11992,7 @@
         </p:nvSpPr>
         <p:spPr>
           <a:xfrm>
-            <a:off x="3216275" y="2670175"/>
+            <a:off x="3292475" y="2670175"/>
             <a:ext cx="180446" cy="355600"/>
           </a:xfrm>
           <a:custGeom>
@@ -11557,7 +12083,7 @@
         </p:nvSpPr>
         <p:spPr>
           <a:xfrm>
-            <a:off x="3216275" y="4130675"/>
+            <a:off x="3292475" y="4130675"/>
             <a:ext cx="180446" cy="660400"/>
           </a:xfrm>
           <a:custGeom>
@@ -11666,7 +12192,7 @@
         </p:nvSpPr>
         <p:spPr>
           <a:xfrm>
-            <a:off x="3200400" y="3124200"/>
+            <a:off x="3276600" y="3124200"/>
             <a:ext cx="180446" cy="965200"/>
           </a:xfrm>
           <a:custGeom>
@@ -11781,7 +12307,7 @@
         </p:nvSpPr>
         <p:spPr>
           <a:xfrm>
-            <a:off x="3200400" y="1981200"/>
+            <a:off x="3276600" y="1981200"/>
             <a:ext cx="180446" cy="660400"/>
           </a:xfrm>
           <a:custGeom>
@@ -11879,6 +12405,66 @@
           <a:p>
             <a:pPr algn="ctr"/>
             <a:endParaRPr lang="en-US"/>
+          </a:p>
+        </p:txBody>
+      </p:sp>
+      <p:sp>
+        <p:nvSpPr>
+          <p:cNvPr id="9" name="TextBox 8"/>
+          <p:cNvSpPr txBox="1"/>
+          <p:nvPr/>
+        </p:nvSpPr>
+        <p:spPr>
+          <a:xfrm>
+            <a:off x="4876800" y="1371600"/>
+            <a:ext cx="304800" cy="369332"/>
+          </a:xfrm>
+          <a:prstGeom prst="rect">
+            <a:avLst/>
+          </a:prstGeom>
+          <a:noFill/>
+        </p:spPr>
+        <p:txBody>
+          <a:bodyPr wrap="square" rtlCol="0">
+            <a:spAutoFit/>
+          </a:bodyPr>
+          <a:lstStyle/>
+          <a:p>
+            <a:r>
+              <a:rPr lang="en-US" dirty="0" smtClean="0"/>
+              <a:t>0</a:t>
+            </a:r>
+            <a:endParaRPr lang="en-US" dirty="0"/>
+          </a:p>
+        </p:txBody>
+      </p:sp>
+      <p:sp>
+        <p:nvSpPr>
+          <p:cNvPr id="10" name="TextBox 9"/>
+          <p:cNvSpPr txBox="1"/>
+          <p:nvPr/>
+        </p:nvSpPr>
+        <p:spPr>
+          <a:xfrm>
+            <a:off x="4114800" y="2667000"/>
+            <a:ext cx="2667000" cy="646331"/>
+          </a:xfrm>
+          <a:prstGeom prst="rect">
+            <a:avLst/>
+          </a:prstGeom>
+          <a:noFill/>
+        </p:spPr>
+        <p:txBody>
+          <a:bodyPr wrap="square" rtlCol="0">
+            <a:spAutoFit/>
+          </a:bodyPr>
+          <a:lstStyle/>
+          <a:p>
+            <a:r>
+              <a:rPr lang="en-US" dirty="0" smtClean="0"/>
+              <a:t>Insert an item into slot 5.  Again, no collision.</a:t>
+            </a:r>
+            <a:endParaRPr lang="en-US" dirty="0"/>
           </a:p>
         </p:txBody>
       </p:sp>
@@ -11927,8 +12513,8 @@
               </a:tblPr>
               <a:tblGrid>
                 <a:gridCol w="711200"/>
-                <a:gridCol w="711200"/>
-                <a:gridCol w="711200"/>
+                <a:gridCol w="812800"/>
+                <a:gridCol w="609600"/>
               </a:tblGrid>
               <a:tr h="370840">
                 <a:tc>
@@ -12063,8 +12649,8 @@
                     <a:lstStyle/>
                     <a:p>
                       <a:r>
-                        <a:rPr lang="en-US" dirty="0" err="1" smtClean="0"/>
-                        <a:t>qur</a:t>
+                        <a:rPr lang="en-US" dirty="0" smtClean="0"/>
+                        <a:t>qur-2</a:t>
                       </a:r>
                       <a:endParaRPr lang="en-US" dirty="0"/>
                     </a:p>
@@ -12213,8 +12799,9 @@
                       </a:pPr>
                       <a:r>
                         <a:rPr lang="en-US" dirty="0" smtClean="0"/>
-                        <a:t>dim</a:t>
-                      </a:r>
+                        <a:t>dim-5</a:t>
+                      </a:r>
+                      <a:endParaRPr lang="en-US" dirty="0" smtClean="0"/>
                     </a:p>
                   </a:txBody>
                   <a:tcPr/>
@@ -12263,8 +12850,8 @@
                     <a:lstStyle/>
                     <a:p>
                       <a:r>
-                        <a:rPr lang="en-US" dirty="0" err="1" smtClean="0"/>
-                        <a:t>aty</a:t>
+                        <a:rPr lang="en-US" dirty="0" smtClean="0"/>
+                        <a:t>aty-6</a:t>
                       </a:r>
                       <a:endParaRPr lang="en-US" dirty="0"/>
                     </a:p>
@@ -12355,8 +12942,8 @@
                     <a:lstStyle/>
                     <a:p>
                       <a:r>
-                        <a:rPr lang="en-US" dirty="0" err="1" smtClean="0"/>
-                        <a:t>qrj</a:t>
+                        <a:rPr lang="en-US" dirty="0" smtClean="0"/>
+                        <a:t>qrj-8</a:t>
                       </a:r>
                       <a:endParaRPr lang="en-US" dirty="0"/>
                     </a:p>
@@ -12438,7 +13025,7 @@
         </p:nvCxnSpPr>
         <p:spPr>
           <a:xfrm rot="10800000">
-            <a:off x="3733800" y="1905000"/>
+            <a:off x="3810000" y="1905000"/>
             <a:ext cx="990600" cy="1588"/>
           </a:xfrm>
           <a:prstGeom prst="straightConnector1">
@@ -12471,7 +13058,7 @@
         </p:nvSpPr>
         <p:spPr>
           <a:xfrm>
-            <a:off x="3216275" y="2670175"/>
+            <a:off x="3292475" y="2670175"/>
             <a:ext cx="180446" cy="355600"/>
           </a:xfrm>
           <a:custGeom>
@@ -12562,7 +13149,7 @@
         </p:nvSpPr>
         <p:spPr>
           <a:xfrm>
-            <a:off x="3216275" y="4130675"/>
+            <a:off x="3292475" y="4130675"/>
             <a:ext cx="180446" cy="660400"/>
           </a:xfrm>
           <a:custGeom>
@@ -12671,7 +13258,7 @@
         </p:nvSpPr>
         <p:spPr>
           <a:xfrm>
-            <a:off x="3200400" y="1981200"/>
+            <a:off x="3276600" y="1981200"/>
             <a:ext cx="180446" cy="660400"/>
           </a:xfrm>
           <a:custGeom>
@@ -12780,7 +13367,7 @@
         </p:nvSpPr>
         <p:spPr>
           <a:xfrm>
-            <a:off x="3200400" y="3124200"/>
+            <a:off x="3276600" y="3124200"/>
             <a:ext cx="180446" cy="965200"/>
           </a:xfrm>
           <a:custGeom>
@@ -12963,6 +13550,104 @@
           <a:p>
             <a:pPr algn="ctr"/>
             <a:endParaRPr lang="en-US"/>
+          </a:p>
+        </p:txBody>
+      </p:sp>
+      <p:sp>
+        <p:nvSpPr>
+          <p:cNvPr id="9" name="TextBox 8"/>
+          <p:cNvSpPr txBox="1"/>
+          <p:nvPr/>
+        </p:nvSpPr>
+        <p:spPr>
+          <a:xfrm>
+            <a:off x="4876800" y="1752600"/>
+            <a:ext cx="304800" cy="369332"/>
+          </a:xfrm>
+          <a:prstGeom prst="rect">
+            <a:avLst/>
+          </a:prstGeom>
+          <a:noFill/>
+        </p:spPr>
+        <p:txBody>
+          <a:bodyPr wrap="square" rtlCol="0">
+            <a:spAutoFit/>
+          </a:bodyPr>
+          <a:lstStyle/>
+          <a:p>
+            <a:r>
+              <a:rPr lang="en-US" dirty="0" smtClean="0">
+                <a:solidFill>
+                  <a:srgbClr val="FF0000"/>
+                </a:solidFill>
+              </a:rPr>
+              <a:t>1</a:t>
+            </a:r>
+            <a:endParaRPr lang="en-US" dirty="0">
+              <a:solidFill>
+                <a:srgbClr val="FF0000"/>
+              </a:solidFill>
+            </a:endParaRPr>
+          </a:p>
+        </p:txBody>
+      </p:sp>
+      <p:sp>
+        <p:nvSpPr>
+          <p:cNvPr id="10" name="TextBox 9"/>
+          <p:cNvSpPr txBox="1"/>
+          <p:nvPr/>
+        </p:nvSpPr>
+        <p:spPr>
+          <a:xfrm>
+            <a:off x="4038600" y="2438400"/>
+            <a:ext cx="4495800" cy="2585323"/>
+          </a:xfrm>
+          <a:prstGeom prst="rect">
+            <a:avLst/>
+          </a:prstGeom>
+          <a:noFill/>
+        </p:spPr>
+        <p:txBody>
+          <a:bodyPr wrap="square" rtlCol="0">
+            <a:spAutoFit/>
+          </a:bodyPr>
+          <a:lstStyle/>
+          <a:p>
+            <a:r>
+              <a:rPr lang="en-US" dirty="0" smtClean="0"/>
+              <a:t>The next data item wants to be in slot 8:  collision.</a:t>
+            </a:r>
+          </a:p>
+          <a:p>
+            <a:pPr>
+              <a:buFont typeface="Arial" charset="0"/>
+              <a:buChar char="•"/>
+            </a:pPr>
+            <a:r>
+              <a:rPr lang="en-US" dirty="0" smtClean="0"/>
+              <a:t> Insert it into the collision slot (0) and update the collision slot pointer to the next in the list (1).</a:t>
+            </a:r>
+          </a:p>
+          <a:p>
+            <a:pPr>
+              <a:buFont typeface="Arial" charset="0"/>
+              <a:buChar char="•"/>
+            </a:pPr>
+            <a:r>
+              <a:rPr lang="en-US" dirty="0" smtClean="0"/>
+              <a:t> </a:t>
+            </a:r>
+            <a:r>
+              <a:rPr lang="en-US" dirty="0" smtClean="0"/>
+              <a:t>Add a pointer from slot 8 to this item – this is the chain for slot 8, so that during lookup, this item can be found.</a:t>
+            </a:r>
+          </a:p>
+          <a:p>
+            <a:pPr>
+              <a:buFont typeface="Arial" charset="0"/>
+              <a:buChar char="•"/>
+            </a:pPr>
+            <a:endParaRPr lang="en-US" dirty="0"/>
           </a:p>
         </p:txBody>
       </p:sp>
@@ -13011,8 +13696,8 @@
               </a:tblPr>
               <a:tblGrid>
                 <a:gridCol w="711200"/>
-                <a:gridCol w="711200"/>
-                <a:gridCol w="711200"/>
+                <a:gridCol w="812800"/>
+                <a:gridCol w="609600"/>
               </a:tblGrid>
               <a:tr h="370840">
                 <a:tc>
@@ -13035,8 +13720,8 @@
                     <a:lstStyle/>
                     <a:p>
                       <a:r>
-                        <a:rPr lang="en-US" dirty="0" err="1" smtClean="0"/>
-                        <a:t>ofu</a:t>
+                        <a:rPr lang="en-US" dirty="0" smtClean="0"/>
+                        <a:t>ofu-8</a:t>
                       </a:r>
                       <a:endParaRPr lang="en-US" dirty="0"/>
                     </a:p>
@@ -13147,8 +13832,8 @@
                     <a:lstStyle/>
                     <a:p>
                       <a:r>
-                        <a:rPr lang="en-US" dirty="0" err="1" smtClean="0"/>
-                        <a:t>qur</a:t>
+                        <a:rPr lang="en-US" dirty="0" smtClean="0"/>
+                        <a:t>qur-2</a:t>
                       </a:r>
                       <a:endParaRPr lang="en-US" dirty="0"/>
                     </a:p>
@@ -13297,8 +13982,9 @@
                       </a:pPr>
                       <a:r>
                         <a:rPr lang="en-US" dirty="0" smtClean="0"/>
-                        <a:t>dim</a:t>
-                      </a:r>
+                        <a:t>dim-5</a:t>
+                      </a:r>
+                      <a:endParaRPr lang="en-US" dirty="0" smtClean="0"/>
                     </a:p>
                   </a:txBody>
                   <a:tcPr/>
@@ -13347,8 +14033,8 @@
                     <a:lstStyle/>
                     <a:p>
                       <a:r>
-                        <a:rPr lang="en-US" dirty="0" err="1" smtClean="0"/>
-                        <a:t>aty</a:t>
+                        <a:rPr lang="en-US" dirty="0" smtClean="0"/>
+                        <a:t>aty-6</a:t>
                       </a:r>
                       <a:endParaRPr lang="en-US" dirty="0"/>
                     </a:p>
@@ -13439,8 +14125,8 @@
                     <a:lstStyle/>
                     <a:p>
                       <a:r>
-                        <a:rPr lang="en-US" dirty="0" err="1" smtClean="0"/>
-                        <a:t>qrj</a:t>
+                        <a:rPr lang="en-US" dirty="0" smtClean="0"/>
+                        <a:t>qrj-8</a:t>
                       </a:r>
                       <a:endParaRPr lang="en-US" dirty="0"/>
                     </a:p>
@@ -13522,7 +14208,7 @@
         </p:nvCxnSpPr>
         <p:spPr>
           <a:xfrm rot="10800000">
-            <a:off x="3657600" y="2667000"/>
+            <a:off x="3733800" y="2667000"/>
             <a:ext cx="990600" cy="1588"/>
           </a:xfrm>
           <a:prstGeom prst="straightConnector1">
@@ -13555,7 +14241,7 @@
         </p:nvSpPr>
         <p:spPr>
           <a:xfrm>
-            <a:off x="3216275" y="2670175"/>
+            <a:off x="3292475" y="2670175"/>
             <a:ext cx="180446" cy="355600"/>
           </a:xfrm>
           <a:custGeom>
@@ -13646,7 +14332,7 @@
         </p:nvSpPr>
         <p:spPr>
           <a:xfrm>
-            <a:off x="3216275" y="4130675"/>
+            <a:off x="3292475" y="4130675"/>
             <a:ext cx="180446" cy="660400"/>
           </a:xfrm>
           <a:custGeom>
@@ -13755,7 +14441,7 @@
         </p:nvSpPr>
         <p:spPr>
           <a:xfrm>
-            <a:off x="3200400" y="3124200"/>
+            <a:off x="3276600" y="3124200"/>
             <a:ext cx="180446" cy="965200"/>
           </a:xfrm>
           <a:custGeom>
@@ -14017,6 +14703,98 @@
           <a:p>
             <a:pPr algn="ctr"/>
             <a:endParaRPr lang="en-US"/>
+          </a:p>
+        </p:txBody>
+      </p:sp>
+      <p:sp>
+        <p:nvSpPr>
+          <p:cNvPr id="11" name="TextBox 10"/>
+          <p:cNvSpPr txBox="1"/>
+          <p:nvPr/>
+        </p:nvSpPr>
+        <p:spPr>
+          <a:xfrm>
+            <a:off x="4800600" y="2514600"/>
+            <a:ext cx="304800" cy="369332"/>
+          </a:xfrm>
+          <a:prstGeom prst="rect">
+            <a:avLst/>
+          </a:prstGeom>
+          <a:noFill/>
+        </p:spPr>
+        <p:txBody>
+          <a:bodyPr wrap="square" rtlCol="0">
+            <a:spAutoFit/>
+          </a:bodyPr>
+          <a:lstStyle/>
+          <a:p>
+            <a:r>
+              <a:rPr lang="en-US" dirty="0" smtClean="0">
+                <a:solidFill>
+                  <a:srgbClr val="FF0000"/>
+                </a:solidFill>
+              </a:rPr>
+              <a:t>3</a:t>
+            </a:r>
+            <a:endParaRPr lang="en-US" dirty="0">
+              <a:solidFill>
+                <a:srgbClr val="FF0000"/>
+              </a:solidFill>
+            </a:endParaRPr>
+          </a:p>
+        </p:txBody>
+      </p:sp>
+      <p:sp>
+        <p:nvSpPr>
+          <p:cNvPr id="13" name="TextBox 12"/>
+          <p:cNvSpPr txBox="1"/>
+          <p:nvPr/>
+        </p:nvSpPr>
+        <p:spPr>
+          <a:xfrm>
+            <a:off x="4114800" y="2971800"/>
+            <a:ext cx="4419600" cy="2031325"/>
+          </a:xfrm>
+          <a:prstGeom prst="rect">
+            <a:avLst/>
+          </a:prstGeom>
+          <a:noFill/>
+        </p:spPr>
+        <p:txBody>
+          <a:bodyPr wrap="square" rtlCol="0">
+            <a:spAutoFit/>
+          </a:bodyPr>
+          <a:lstStyle/>
+          <a:p>
+            <a:r>
+              <a:rPr lang="en-US" dirty="0" smtClean="0"/>
+              <a:t>Next item also wants to be in slot 8:  collision.</a:t>
+            </a:r>
+          </a:p>
+          <a:p>
+            <a:pPr>
+              <a:buFont typeface="Arial" charset="0"/>
+              <a:buChar char="•"/>
+            </a:pPr>
+            <a:r>
+              <a:rPr lang="en-US" dirty="0" smtClean="0"/>
+              <a:t> Insert it into the new collision slot (1) and update the collision slot pointer to the next in the list (3).</a:t>
+            </a:r>
+          </a:p>
+          <a:p>
+            <a:pPr>
+              <a:buFont typeface="Arial" charset="0"/>
+              <a:buChar char="•"/>
+            </a:pPr>
+            <a:r>
+              <a:rPr lang="en-US" dirty="0" smtClean="0"/>
+              <a:t> </a:t>
+            </a:r>
+            <a:r>
+              <a:rPr lang="en-US" dirty="0" smtClean="0"/>
+              <a:t>Add this to the end of the slot 8 chain: a pointer from slot 0 to this item.</a:t>
+            </a:r>
+            <a:endParaRPr lang="en-US" dirty="0"/>
           </a:p>
         </p:txBody>
       </p:sp>
@@ -14065,8 +14843,8 @@
               </a:tblPr>
               <a:tblGrid>
                 <a:gridCol w="711200"/>
-                <a:gridCol w="711200"/>
-                <a:gridCol w="711200"/>
+                <a:gridCol w="812800"/>
+                <a:gridCol w="609600"/>
               </a:tblGrid>
               <a:tr h="370840">
                 <a:tc>
@@ -14089,8 +14867,8 @@
                     <a:lstStyle/>
                     <a:p>
                       <a:r>
-                        <a:rPr lang="en-US" dirty="0" err="1" smtClean="0"/>
-                        <a:t>ofu</a:t>
+                        <a:rPr lang="en-US" dirty="0" smtClean="0"/>
+                        <a:t>ofu-8</a:t>
                       </a:r>
                       <a:endParaRPr lang="en-US" dirty="0"/>
                     </a:p>
@@ -14141,12 +14919,16 @@
                     <a:lstStyle/>
                     <a:p>
                       <a:r>
-                        <a:rPr lang="en-US" dirty="0" err="1" smtClean="0">
+                        <a:rPr lang="en-US" dirty="0" smtClean="0">
                           <a:solidFill>
                             <a:schemeClr val="tx1"/>
                           </a:solidFill>
                         </a:rPr>
                         <a:t>gcl</a:t>
+                      </a:r>
+                      <a:r>
+                        <a:rPr lang="en-US" dirty="0" smtClean="0"/>
+                        <a:t>-8</a:t>
                       </a:r>
                       <a:endParaRPr lang="en-US" dirty="0">
                         <a:solidFill>
@@ -14201,8 +14983,8 @@
                     <a:lstStyle/>
                     <a:p>
                       <a:r>
-                        <a:rPr lang="en-US" dirty="0" err="1" smtClean="0"/>
-                        <a:t>qur</a:t>
+                        <a:rPr lang="en-US" dirty="0" smtClean="0"/>
+                        <a:t>qur-2</a:t>
                       </a:r>
                       <a:endParaRPr lang="en-US" dirty="0"/>
                     </a:p>
@@ -14342,7 +15124,7 @@
                     <a:p>
                       <a:r>
                         <a:rPr lang="en-US" dirty="0" smtClean="0"/>
-                        <a:t>dim</a:t>
+                        <a:t>dim-5</a:t>
                       </a:r>
                       <a:endParaRPr lang="en-US" dirty="0"/>
                     </a:p>
@@ -14393,8 +15175,8 @@
                     <a:lstStyle/>
                     <a:p>
                       <a:r>
-                        <a:rPr lang="en-US" dirty="0" err="1" smtClean="0"/>
-                        <a:t>aty</a:t>
+                        <a:rPr lang="en-US" dirty="0" smtClean="0"/>
+                        <a:t>aty-6</a:t>
                       </a:r>
                       <a:endParaRPr lang="en-US" dirty="0"/>
                     </a:p>
@@ -14445,12 +15227,12 @@
                     <a:lstStyle/>
                     <a:p>
                       <a:r>
-                        <a:rPr lang="en-US" dirty="0" err="1" smtClean="0">
+                        <a:rPr lang="en-US" dirty="0" smtClean="0">
                           <a:solidFill>
                             <a:srgbClr val="FF0000"/>
                           </a:solidFill>
                         </a:rPr>
-                        <a:t>rhv</a:t>
+                        <a:t>rhv-7</a:t>
                       </a:r>
                       <a:endParaRPr lang="en-US" dirty="0">
                         <a:solidFill>
@@ -14505,8 +15287,8 @@
                     <a:lstStyle/>
                     <a:p>
                       <a:r>
-                        <a:rPr lang="en-US" dirty="0" err="1" smtClean="0"/>
-                        <a:t>qrj</a:t>
+                        <a:rPr lang="en-US" dirty="0" smtClean="0"/>
+                        <a:t>qrj-8</a:t>
                       </a:r>
                       <a:endParaRPr lang="en-US" dirty="0"/>
                     </a:p>
@@ -14588,7 +15370,7 @@
         </p:nvCxnSpPr>
         <p:spPr>
           <a:xfrm rot="10800000">
-            <a:off x="3657600" y="2667000"/>
+            <a:off x="3733800" y="2667000"/>
             <a:ext cx="990600" cy="1588"/>
           </a:xfrm>
           <a:prstGeom prst="straightConnector1">
@@ -14621,7 +15403,7 @@
         </p:nvSpPr>
         <p:spPr>
           <a:xfrm>
-            <a:off x="3216275" y="2670175"/>
+            <a:off x="3292475" y="2670175"/>
             <a:ext cx="180446" cy="355600"/>
           </a:xfrm>
           <a:custGeom>
@@ -14712,7 +15494,7 @@
         </p:nvSpPr>
         <p:spPr>
           <a:xfrm>
-            <a:off x="3200400" y="3124200"/>
+            <a:off x="3276600" y="3124200"/>
             <a:ext cx="180446" cy="1651000"/>
           </a:xfrm>
           <a:custGeom>
@@ -14980,6 +15762,66 @@
           <a:p>
             <a:pPr algn="ctr"/>
             <a:endParaRPr lang="en-US"/>
+          </a:p>
+        </p:txBody>
+      </p:sp>
+      <p:sp>
+        <p:nvSpPr>
+          <p:cNvPr id="10" name="TextBox 9"/>
+          <p:cNvSpPr txBox="1"/>
+          <p:nvPr/>
+        </p:nvSpPr>
+        <p:spPr>
+          <a:xfrm>
+            <a:off x="4800600" y="2514600"/>
+            <a:ext cx="304800" cy="369332"/>
+          </a:xfrm>
+          <a:prstGeom prst="rect">
+            <a:avLst/>
+          </a:prstGeom>
+          <a:noFill/>
+        </p:spPr>
+        <p:txBody>
+          <a:bodyPr wrap="square" rtlCol="0">
+            <a:spAutoFit/>
+          </a:bodyPr>
+          <a:lstStyle/>
+          <a:p>
+            <a:r>
+              <a:rPr lang="en-US" dirty="0" smtClean="0"/>
+              <a:t>3</a:t>
+            </a:r>
+            <a:endParaRPr lang="en-US" dirty="0"/>
+          </a:p>
+        </p:txBody>
+      </p:sp>
+      <p:sp>
+        <p:nvSpPr>
+          <p:cNvPr id="11" name="TextBox 10"/>
+          <p:cNvSpPr txBox="1"/>
+          <p:nvPr/>
+        </p:nvSpPr>
+        <p:spPr>
+          <a:xfrm>
+            <a:off x="4114800" y="3276600"/>
+            <a:ext cx="2667000" cy="646331"/>
+          </a:xfrm>
+          <a:prstGeom prst="rect">
+            <a:avLst/>
+          </a:prstGeom>
+          <a:noFill/>
+        </p:spPr>
+        <p:txBody>
+          <a:bodyPr wrap="square" rtlCol="0">
+            <a:spAutoFit/>
+          </a:bodyPr>
+          <a:lstStyle/>
+          <a:p>
+            <a:r>
+              <a:rPr lang="en-US" dirty="0" smtClean="0"/>
+              <a:t>Insert an item into slot 7.  No collision.</a:t>
+            </a:r>
+            <a:endParaRPr lang="en-US" dirty="0"/>
           </a:p>
         </p:txBody>
       </p:sp>
@@ -15028,8 +15870,8 @@
               </a:tblPr>
               <a:tblGrid>
                 <a:gridCol w="711200"/>
-                <a:gridCol w="711200"/>
-                <a:gridCol w="711200"/>
+                <a:gridCol w="812800"/>
+                <a:gridCol w="609600"/>
               </a:tblGrid>
               <a:tr h="370840">
                 <a:tc>
@@ -15052,8 +15894,8 @@
                     <a:lstStyle/>
                     <a:p>
                       <a:r>
-                        <a:rPr lang="en-US" dirty="0" err="1" smtClean="0"/>
-                        <a:t>ofu</a:t>
+                        <a:rPr lang="en-US" dirty="0" smtClean="0"/>
+                        <a:t>ofu-8</a:t>
                       </a:r>
                       <a:endParaRPr lang="en-US" dirty="0"/>
                     </a:p>
@@ -15104,12 +15946,16 @@
                     <a:lstStyle/>
                     <a:p>
                       <a:r>
-                        <a:rPr lang="en-US" dirty="0" err="1" smtClean="0">
+                        <a:rPr lang="en-US" dirty="0" smtClean="0">
                           <a:solidFill>
                             <a:schemeClr val="tx1"/>
                           </a:solidFill>
                         </a:rPr>
                         <a:t>gcl</a:t>
+                      </a:r>
+                      <a:r>
+                        <a:rPr lang="en-US" dirty="0" smtClean="0"/>
+                        <a:t>-8</a:t>
                       </a:r>
                       <a:endParaRPr lang="en-US" dirty="0">
                         <a:solidFill>
@@ -15164,8 +16010,8 @@
                     <a:lstStyle/>
                     <a:p>
                       <a:r>
-                        <a:rPr lang="en-US" dirty="0" err="1" smtClean="0"/>
-                        <a:t>qur</a:t>
+                        <a:rPr lang="en-US" dirty="0" smtClean="0"/>
+                        <a:t>qur-2</a:t>
                       </a:r>
                       <a:endParaRPr lang="en-US" dirty="0"/>
                     </a:p>
@@ -15317,7 +16163,7 @@
                     <a:p>
                       <a:r>
                         <a:rPr lang="en-US" dirty="0" smtClean="0"/>
-                        <a:t>dim</a:t>
+                        <a:t>dim-5</a:t>
                       </a:r>
                       <a:endParaRPr lang="en-US" dirty="0"/>
                     </a:p>
@@ -15368,8 +16214,8 @@
                     <a:lstStyle/>
                     <a:p>
                       <a:r>
-                        <a:rPr lang="en-US" dirty="0" err="1" smtClean="0"/>
-                        <a:t>aty</a:t>
+                        <a:rPr lang="en-US" dirty="0" smtClean="0"/>
+                        <a:t>aty-6</a:t>
                       </a:r>
                       <a:endParaRPr lang="en-US" dirty="0"/>
                     </a:p>
@@ -15420,8 +16266,8 @@
                     <a:lstStyle/>
                     <a:p>
                       <a:r>
-                        <a:rPr lang="en-US" dirty="0" err="1" smtClean="0"/>
-                        <a:t>rhv</a:t>
+                        <a:rPr lang="en-US" dirty="0" smtClean="0"/>
+                        <a:t>rhv-7</a:t>
                       </a:r>
                       <a:endParaRPr lang="en-US" dirty="0"/>
                     </a:p>
@@ -15472,8 +16318,8 @@
                     <a:lstStyle/>
                     <a:p>
                       <a:r>
-                        <a:rPr lang="en-US" dirty="0" err="1" smtClean="0"/>
-                        <a:t>qrj</a:t>
+                        <a:rPr lang="en-US" dirty="0" smtClean="0"/>
+                        <a:t>qrj-8</a:t>
                       </a:r>
                       <a:endParaRPr lang="en-US" dirty="0"/>
                     </a:p>
@@ -15555,7 +16401,7 @@
         </p:nvCxnSpPr>
         <p:spPr>
           <a:xfrm rot="10800000">
-            <a:off x="3657600" y="3048000"/>
+            <a:off x="3733800" y="3048000"/>
             <a:ext cx="990600" cy="1588"/>
           </a:xfrm>
           <a:prstGeom prst="straightConnector1">
@@ -15588,7 +16434,7 @@
         </p:nvSpPr>
         <p:spPr>
           <a:xfrm>
-            <a:off x="3200400" y="3124200"/>
+            <a:off x="3276600" y="3124200"/>
             <a:ext cx="180446" cy="1651000"/>
           </a:xfrm>
           <a:custGeom>
@@ -15947,6 +16793,98 @@
           <a:p>
             <a:pPr algn="ctr"/>
             <a:endParaRPr lang="en-US"/>
+          </a:p>
+        </p:txBody>
+      </p:sp>
+      <p:sp>
+        <p:nvSpPr>
+          <p:cNvPr id="10" name="TextBox 9"/>
+          <p:cNvSpPr txBox="1"/>
+          <p:nvPr/>
+        </p:nvSpPr>
+        <p:spPr>
+          <a:xfrm>
+            <a:off x="4800600" y="2895600"/>
+            <a:ext cx="304800" cy="369332"/>
+          </a:xfrm>
+          <a:prstGeom prst="rect">
+            <a:avLst/>
+          </a:prstGeom>
+          <a:noFill/>
+        </p:spPr>
+        <p:txBody>
+          <a:bodyPr wrap="square" rtlCol="0">
+            <a:spAutoFit/>
+          </a:bodyPr>
+          <a:lstStyle/>
+          <a:p>
+            <a:r>
+              <a:rPr lang="en-US" dirty="0" smtClean="0">
+                <a:solidFill>
+                  <a:srgbClr val="FF0000"/>
+                </a:solidFill>
+              </a:rPr>
+              <a:t>4</a:t>
+            </a:r>
+            <a:endParaRPr lang="en-US" dirty="0">
+              <a:solidFill>
+                <a:srgbClr val="FF0000"/>
+              </a:solidFill>
+            </a:endParaRPr>
+          </a:p>
+        </p:txBody>
+      </p:sp>
+      <p:sp>
+        <p:nvSpPr>
+          <p:cNvPr id="11" name="TextBox 10"/>
+          <p:cNvSpPr txBox="1"/>
+          <p:nvPr/>
+        </p:nvSpPr>
+        <p:spPr>
+          <a:xfrm>
+            <a:off x="4114800" y="3276600"/>
+            <a:ext cx="4419600" cy="2031325"/>
+          </a:xfrm>
+          <a:prstGeom prst="rect">
+            <a:avLst/>
+          </a:prstGeom>
+          <a:noFill/>
+        </p:spPr>
+        <p:txBody>
+          <a:bodyPr wrap="square" rtlCol="0">
+            <a:spAutoFit/>
+          </a:bodyPr>
+          <a:lstStyle/>
+          <a:p>
+            <a:r>
+              <a:rPr lang="en-US" dirty="0" smtClean="0"/>
+              <a:t>Next item wants to be in slot 1:  collision.</a:t>
+            </a:r>
+          </a:p>
+          <a:p>
+            <a:pPr>
+              <a:buFont typeface="Arial" charset="0"/>
+              <a:buChar char="•"/>
+            </a:pPr>
+            <a:r>
+              <a:rPr lang="en-US" dirty="0" smtClean="0"/>
+              <a:t> Insert it into the collision slot (3) and update the collision slot pointer to the next in the list (4).</a:t>
+            </a:r>
+          </a:p>
+          <a:p>
+            <a:pPr>
+              <a:buFont typeface="Arial" charset="0"/>
+              <a:buChar char="•"/>
+            </a:pPr>
+            <a:r>
+              <a:rPr lang="en-US" dirty="0" smtClean="0"/>
+              <a:t> </a:t>
+            </a:r>
+            <a:r>
+              <a:rPr lang="en-US" dirty="0" smtClean="0"/>
+              <a:t>This time, the slot 1 chain and the slot 8 chains “coalesce”.  We add this to the end of the chain: a pointer from slot 1 to this item.</a:t>
+            </a:r>
+            <a:endParaRPr lang="en-US" dirty="0"/>
           </a:p>
         </p:txBody>
       </p:sp>

</xml_diff>